<commit_message>
Final poster + reorg of files
</commit_message>
<xml_diff>
--- a/Documentation/Poster/final_poster.pptx
+++ b/Documentation/Poster/final_poster.pptx
@@ -106,7 +106,7 @@
   </p:defaultTextStyle>
   <p:extLst>
     <p:ext uri="{EFAFB233-063F-42B5-8137-9DF3F51BA10A}">
-      <p15:sldGuideLst xmlns:p15="http://schemas.microsoft.com/office/powerpoint/2012/main" xmlns="">
+      <p15:sldGuideLst xmlns="" xmlns:p15="http://schemas.microsoft.com/office/powerpoint/2012/main">
         <p15:guide id="1" orient="horz" pos="13824">
           <p15:clr>
             <a:srgbClr val="A4A3A4"/>
@@ -3392,7 +3392,7 @@
           <p:cNvPr id="44" name="Rectangle: Rounded Corners 26">
             <a:extLst>
               <a:ext uri="{FF2B5EF4-FFF2-40B4-BE49-F238E27FC236}">
-                <a16:creationId xmlns:a16="http://schemas.microsoft.com/office/drawing/2014/main" xmlns="" id="{547460F9-6125-439C-BB49-EA0FD687AAEF}"/>
+                <a16:creationId xmlns="" xmlns:a16="http://schemas.microsoft.com/office/drawing/2014/main" id="{547460F9-6125-439C-BB49-EA0FD687AAEF}"/>
               </a:ext>
             </a:extLst>
           </p:cNvPr>
@@ -3446,7 +3446,7 @@
           <p:cNvPr id="5" name="Rectangle: Rounded Corners 4">
             <a:extLst>
               <a:ext uri="{FF2B5EF4-FFF2-40B4-BE49-F238E27FC236}">
-                <a16:creationId xmlns:a16="http://schemas.microsoft.com/office/drawing/2014/main" xmlns="" id="{002E5F98-D49E-404B-8703-2AC14CC626C7}"/>
+                <a16:creationId xmlns="" xmlns:a16="http://schemas.microsoft.com/office/drawing/2014/main" id="{002E5F98-D49E-404B-8703-2AC14CC626C7}"/>
               </a:ext>
             </a:extLst>
           </p:cNvPr>
@@ -3505,7 +3505,7 @@
           <p:cNvPr id="7" name="TextBox 6">
             <a:extLst>
               <a:ext uri="{FF2B5EF4-FFF2-40B4-BE49-F238E27FC236}">
-                <a16:creationId xmlns:a16="http://schemas.microsoft.com/office/drawing/2014/main" xmlns="" id="{493F324A-9DC5-4DD0-A5CC-3B6AB275D6E9}"/>
+                <a16:creationId xmlns="" xmlns:a16="http://schemas.microsoft.com/office/drawing/2014/main" id="{493F324A-9DC5-4DD0-A5CC-3B6AB275D6E9}"/>
               </a:ext>
             </a:extLst>
           </p:cNvPr>
@@ -3672,7 +3672,7 @@
           <p:cNvPr id="15" name="Picture 14">
             <a:extLst>
               <a:ext uri="{FF2B5EF4-FFF2-40B4-BE49-F238E27FC236}">
-                <a16:creationId xmlns:a16="http://schemas.microsoft.com/office/drawing/2014/main" xmlns="" id="{16AFBF06-3C01-414B-9799-13C37F7DEA0A}"/>
+                <a16:creationId xmlns="" xmlns:a16="http://schemas.microsoft.com/office/drawing/2014/main" id="{16AFBF06-3C01-414B-9799-13C37F7DEA0A}"/>
               </a:ext>
             </a:extLst>
           </p:cNvPr>
@@ -3708,7 +3708,7 @@
           <p:cNvPr id="17" name="TextBox 16">
             <a:extLst>
               <a:ext uri="{FF2B5EF4-FFF2-40B4-BE49-F238E27FC236}">
-                <a16:creationId xmlns:a16="http://schemas.microsoft.com/office/drawing/2014/main" xmlns="" id="{2090E5B4-8004-4613-ACAE-AC7AF7B4E183}"/>
+                <a16:creationId xmlns="" xmlns:a16="http://schemas.microsoft.com/office/drawing/2014/main" id="{2090E5B4-8004-4613-ACAE-AC7AF7B4E183}"/>
               </a:ext>
             </a:extLst>
           </p:cNvPr>
@@ -3786,7 +3786,7 @@
           <p:cNvPr id="27" name="Rectangle: Rounded Corners 26">
             <a:extLst>
               <a:ext uri="{FF2B5EF4-FFF2-40B4-BE49-F238E27FC236}">
-                <a16:creationId xmlns:a16="http://schemas.microsoft.com/office/drawing/2014/main" xmlns="" id="{547460F9-6125-439C-BB49-EA0FD687AAEF}"/>
+                <a16:creationId xmlns="" xmlns:a16="http://schemas.microsoft.com/office/drawing/2014/main" id="{547460F9-6125-439C-BB49-EA0FD687AAEF}"/>
               </a:ext>
             </a:extLst>
           </p:cNvPr>
@@ -3840,7 +3840,7 @@
           <p:cNvPr id="18" name="TextBox 17">
             <a:extLst>
               <a:ext uri="{FF2B5EF4-FFF2-40B4-BE49-F238E27FC236}">
-                <a16:creationId xmlns:a16="http://schemas.microsoft.com/office/drawing/2014/main" xmlns="" id="{A53BCD02-C41B-4C80-BA8E-E1D0B772A436}"/>
+                <a16:creationId xmlns="" xmlns:a16="http://schemas.microsoft.com/office/drawing/2014/main" id="{A53BCD02-C41B-4C80-BA8E-E1D0B772A436}"/>
               </a:ext>
             </a:extLst>
           </p:cNvPr>
@@ -3901,7 +3901,7 @@
           <p:cNvPr id="24" name="Rectangle: Rounded Corners 23">
             <a:extLst>
               <a:ext uri="{FF2B5EF4-FFF2-40B4-BE49-F238E27FC236}">
-                <a16:creationId xmlns:a16="http://schemas.microsoft.com/office/drawing/2014/main" xmlns="" id="{20C3A4B6-7F81-4D84-A0AC-A451E4CE9948}"/>
+                <a16:creationId xmlns="" xmlns:a16="http://schemas.microsoft.com/office/drawing/2014/main" id="{20C3A4B6-7F81-4D84-A0AC-A451E4CE9948}"/>
               </a:ext>
             </a:extLst>
           </p:cNvPr>
@@ -3955,7 +3955,7 @@
           <p:cNvPr id="19" name="TextBox 18">
             <a:extLst>
               <a:ext uri="{FF2B5EF4-FFF2-40B4-BE49-F238E27FC236}">
-                <a16:creationId xmlns:a16="http://schemas.microsoft.com/office/drawing/2014/main" xmlns="" id="{6E8274EB-049F-4F03-9E0A-F57B6042F612}"/>
+                <a16:creationId xmlns="" xmlns:a16="http://schemas.microsoft.com/office/drawing/2014/main" id="{6E8274EB-049F-4F03-9E0A-F57B6042F612}"/>
               </a:ext>
             </a:extLst>
           </p:cNvPr>
@@ -4014,7 +4014,7 @@
           <p:cNvPr id="20" name="TextBox 19">
             <a:extLst>
               <a:ext uri="{FF2B5EF4-FFF2-40B4-BE49-F238E27FC236}">
-                <a16:creationId xmlns:a16="http://schemas.microsoft.com/office/drawing/2014/main" xmlns="" id="{A5A4FABB-069E-48CE-BA46-E6269879E309}"/>
+                <a16:creationId xmlns="" xmlns:a16="http://schemas.microsoft.com/office/drawing/2014/main" id="{A5A4FABB-069E-48CE-BA46-E6269879E309}"/>
               </a:ext>
             </a:extLst>
           </p:cNvPr>
@@ -4054,7 +4054,7 @@
           <p:cNvPr id="23" name="Picture 22">
             <a:extLst>
               <a:ext uri="{FF2B5EF4-FFF2-40B4-BE49-F238E27FC236}">
-                <a16:creationId xmlns:a16="http://schemas.microsoft.com/office/drawing/2014/main" xmlns="" id="{F3C5DBEA-C4C5-4D61-BCA1-139E0B5EB265}"/>
+                <a16:creationId xmlns="" xmlns:a16="http://schemas.microsoft.com/office/drawing/2014/main" id="{F3C5DBEA-C4C5-4D61-BCA1-139E0B5EB265}"/>
               </a:ext>
             </a:extLst>
           </p:cNvPr>
@@ -4090,7 +4090,7 @@
           <p:cNvPr id="26" name="TextBox 25">
             <a:extLst>
               <a:ext uri="{FF2B5EF4-FFF2-40B4-BE49-F238E27FC236}">
-                <a16:creationId xmlns:a16="http://schemas.microsoft.com/office/drawing/2014/main" xmlns="" id="{FFDFE913-AC8B-4005-829C-1D8E5429657A}"/>
+                <a16:creationId xmlns="" xmlns:a16="http://schemas.microsoft.com/office/drawing/2014/main" id="{FFDFE913-AC8B-4005-829C-1D8E5429657A}"/>
               </a:ext>
             </a:extLst>
           </p:cNvPr>
@@ -4134,7 +4134,7 @@
           <p:cNvPr id="30" name="Rectangle: Rounded Corners 29">
             <a:extLst>
               <a:ext uri="{FF2B5EF4-FFF2-40B4-BE49-F238E27FC236}">
-                <a16:creationId xmlns:a16="http://schemas.microsoft.com/office/drawing/2014/main" xmlns="" id="{61827293-1939-420B-8340-B5AA2B8704C0}"/>
+                <a16:creationId xmlns="" xmlns:a16="http://schemas.microsoft.com/office/drawing/2014/main" id="{61827293-1939-420B-8340-B5AA2B8704C0}"/>
               </a:ext>
             </a:extLst>
           </p:cNvPr>
@@ -4188,7 +4188,7 @@
           <p:cNvPr id="31" name="TextBox 30">
             <a:extLst>
               <a:ext uri="{FF2B5EF4-FFF2-40B4-BE49-F238E27FC236}">
-                <a16:creationId xmlns:a16="http://schemas.microsoft.com/office/drawing/2014/main" xmlns="" id="{D50E5EB9-4492-4F26-8B86-DD7160B654BE}"/>
+                <a16:creationId xmlns="" xmlns:a16="http://schemas.microsoft.com/office/drawing/2014/main" id="{D50E5EB9-4492-4F26-8B86-DD7160B654BE}"/>
               </a:ext>
             </a:extLst>
           </p:cNvPr>
@@ -4254,7 +4254,7 @@
           <p:cNvPr id="22" name="TextBox 21">
             <a:extLst>
               <a:ext uri="{FF2B5EF4-FFF2-40B4-BE49-F238E27FC236}">
-                <a16:creationId xmlns:a16="http://schemas.microsoft.com/office/drawing/2014/main" xmlns="" id="{56F75D07-2C1C-497C-80D4-A1B74C66352A}"/>
+                <a16:creationId xmlns="" xmlns:a16="http://schemas.microsoft.com/office/drawing/2014/main" id="{56F75D07-2C1C-497C-80D4-A1B74C66352A}"/>
               </a:ext>
             </a:extLst>
           </p:cNvPr>
@@ -4294,7 +4294,7 @@
           <p:cNvPr id="34" name="TextBox 33">
             <a:extLst>
               <a:ext uri="{FF2B5EF4-FFF2-40B4-BE49-F238E27FC236}">
-                <a16:creationId xmlns:a16="http://schemas.microsoft.com/office/drawing/2014/main" xmlns="" id="{720E69F1-593C-48E0-89B9-3812430A05C4}"/>
+                <a16:creationId xmlns="" xmlns:a16="http://schemas.microsoft.com/office/drawing/2014/main" id="{720E69F1-593C-48E0-89B9-3812430A05C4}"/>
               </a:ext>
             </a:extLst>
           </p:cNvPr>
@@ -4352,7 +4352,7 @@
           <p:cNvPr id="36" name="TextBox 35">
             <a:extLst>
               <a:ext uri="{FF2B5EF4-FFF2-40B4-BE49-F238E27FC236}">
-                <a16:creationId xmlns:a16="http://schemas.microsoft.com/office/drawing/2014/main" xmlns="" id="{8DD64718-6B8A-4977-A573-9B3C4C4CA626}"/>
+                <a16:creationId xmlns="" xmlns:a16="http://schemas.microsoft.com/office/drawing/2014/main" id="{8DD64718-6B8A-4977-A573-9B3C4C4CA626}"/>
               </a:ext>
             </a:extLst>
           </p:cNvPr>
@@ -4396,7 +4396,7 @@
           <p:cNvPr id="38" name="TextBox 37">
             <a:extLst>
               <a:ext uri="{FF2B5EF4-FFF2-40B4-BE49-F238E27FC236}">
-                <a16:creationId xmlns:a16="http://schemas.microsoft.com/office/drawing/2014/main" xmlns="" id="{63837D29-6763-40DF-9EA9-C398B42DA42F}"/>
+                <a16:creationId xmlns="" xmlns:a16="http://schemas.microsoft.com/office/drawing/2014/main" id="{63837D29-6763-40DF-9EA9-C398B42DA42F}"/>
               </a:ext>
             </a:extLst>
           </p:cNvPr>
@@ -4453,7 +4453,7 @@
           <p:cNvPr id="39" name="TextBox 38">
             <a:extLst>
               <a:ext uri="{FF2B5EF4-FFF2-40B4-BE49-F238E27FC236}">
-                <a16:creationId xmlns:a16="http://schemas.microsoft.com/office/drawing/2014/main" xmlns="" id="{61F1B7DC-5989-4DC8-BD26-1CA4B4E952F9}"/>
+                <a16:creationId xmlns="" xmlns:a16="http://schemas.microsoft.com/office/drawing/2014/main" id="{61F1B7DC-5989-4DC8-BD26-1CA4B4E952F9}"/>
               </a:ext>
             </a:extLst>
           </p:cNvPr>
@@ -4497,7 +4497,7 @@
           <p:cNvPr id="3" name="Picture 2">
             <a:extLst>
               <a:ext uri="{FF2B5EF4-FFF2-40B4-BE49-F238E27FC236}">
-                <a16:creationId xmlns:a16="http://schemas.microsoft.com/office/drawing/2014/main" xmlns="" id="{A7CFA654-7B40-4836-B43B-546C16A9C86F}"/>
+                <a16:creationId xmlns="" xmlns:a16="http://schemas.microsoft.com/office/drawing/2014/main" id="{A7CFA654-7B40-4836-B43B-546C16A9C86F}"/>
               </a:ext>
             </a:extLst>
           </p:cNvPr>
@@ -4533,7 +4533,7 @@
           <p:cNvPr id="9" name="Picture 8">
             <a:extLst>
               <a:ext uri="{FF2B5EF4-FFF2-40B4-BE49-F238E27FC236}">
-                <a16:creationId xmlns:a16="http://schemas.microsoft.com/office/drawing/2014/main" xmlns="" id="{89747825-4F41-43CE-8F50-2A8B8C8358E2}"/>
+                <a16:creationId xmlns="" xmlns:a16="http://schemas.microsoft.com/office/drawing/2014/main" id="{89747825-4F41-43CE-8F50-2A8B8C8358E2}"/>
               </a:ext>
             </a:extLst>
           </p:cNvPr>
@@ -4569,7 +4569,7 @@
           <p:cNvPr id="8" name="Picture 7">
             <a:extLst>
               <a:ext uri="{FF2B5EF4-FFF2-40B4-BE49-F238E27FC236}">
-                <a16:creationId xmlns:a16="http://schemas.microsoft.com/office/drawing/2014/main" xmlns="" id="{93F168DD-32F4-4758-8312-B53FCA61AD34}"/>
+                <a16:creationId xmlns="" xmlns:a16="http://schemas.microsoft.com/office/drawing/2014/main" id="{93F168DD-32F4-4758-8312-B53FCA61AD34}"/>
               </a:ext>
             </a:extLst>
           </p:cNvPr>
@@ -4605,7 +4605,7 @@
           <p:cNvPr id="48" name="TextBox 47">
             <a:extLst>
               <a:ext uri="{FF2B5EF4-FFF2-40B4-BE49-F238E27FC236}">
-                <a16:creationId xmlns:a16="http://schemas.microsoft.com/office/drawing/2014/main" xmlns="" id="{2034FE8F-E8C4-4962-8048-AD14E25D253F}"/>
+                <a16:creationId xmlns="" xmlns:a16="http://schemas.microsoft.com/office/drawing/2014/main" id="{2034FE8F-E8C4-4962-8048-AD14E25D253F}"/>
               </a:ext>
             </a:extLst>
           </p:cNvPr>
@@ -4644,7 +4644,7 @@
           <p:cNvPr id="50" name="TextBox 49">
             <a:extLst>
               <a:ext uri="{FF2B5EF4-FFF2-40B4-BE49-F238E27FC236}">
-                <a16:creationId xmlns:a16="http://schemas.microsoft.com/office/drawing/2014/main" xmlns="" id="{64458F7E-A529-4EA1-8A71-57B8B8F51129}"/>
+                <a16:creationId xmlns="" xmlns:a16="http://schemas.microsoft.com/office/drawing/2014/main" id="{64458F7E-A529-4EA1-8A71-57B8B8F51129}"/>
               </a:ext>
             </a:extLst>
           </p:cNvPr>
@@ -4703,7 +4703,7 @@
           <p:cNvPr id="58" name="TextBox 57">
             <a:extLst>
               <a:ext uri="{FF2B5EF4-FFF2-40B4-BE49-F238E27FC236}">
-                <a16:creationId xmlns:a16="http://schemas.microsoft.com/office/drawing/2014/main" xmlns="" id="{7F5E996A-F24C-4DBA-B8E3-E69EAF6C9234}"/>
+                <a16:creationId xmlns="" xmlns:a16="http://schemas.microsoft.com/office/drawing/2014/main" id="{7F5E996A-F24C-4DBA-B8E3-E69EAF6C9234}"/>
               </a:ext>
             </a:extLst>
           </p:cNvPr>
@@ -4736,12 +4736,33 @@
             </a:r>
             <a:r>
               <a:rPr lang="en-US" sz="4400" dirty="0"/>
-              <a:t>what you think of our project, and/or to participate in experimental trials</a:t>
+              <a:t>what you think of our project, and/or to participate in experimental </a:t>
             </a:r>
             <a:r>
               <a:rPr lang="en-US" sz="4400" dirty="0" smtClean="0"/>
+              <a:t>trials, </a:t>
+            </a:r>
+            <a:r>
+              <a:rPr lang="en-US" sz="4400" dirty="0" err="1" smtClean="0"/>
+              <a:t>hashtag</a:t>
+            </a:r>
+            <a:r>
+              <a:rPr lang="en-US" sz="4400" dirty="0" smtClean="0"/>
+              <a:t> </a:t>
+            </a:r>
+            <a:r>
+              <a:rPr lang="en-US" sz="4400" b="1" dirty="0"/>
+              <a:t>#</a:t>
+            </a:r>
+            <a:r>
+              <a:rPr lang="en-US" sz="4400" b="1" dirty="0" err="1"/>
+              <a:t>MacCSCapstone</a:t>
+            </a:r>
+            <a:r>
+              <a:rPr lang="en-US" sz="4400" dirty="0"/>
               <a:t>:</a:t>
             </a:r>
+            <a:endParaRPr lang="en-US" sz="4400" dirty="0" smtClean="0"/>
           </a:p>
           <a:p>
             <a:pPr marL="685800" indent="-685800">
@@ -4765,15 +4786,7 @@
             </a:pPr>
             <a:r>
               <a:rPr lang="en-US" sz="4400" dirty="0" smtClean="0"/>
-              <a:t>Please </a:t>
-            </a:r>
-            <a:r>
-              <a:rPr lang="en-US" sz="4400" dirty="0" smtClean="0"/>
-              <a:t>tag</a:t>
-            </a:r>
-            <a:r>
-              <a:rPr lang="en-US" sz="4400" dirty="0" smtClean="0"/>
-              <a:t> </a:t>
+              <a:t>Please tag </a:t>
             </a:r>
             <a:r>
               <a:rPr lang="en-US" sz="4400" dirty="0"/>
@@ -4825,7 +4838,7 @@
           <p:cNvPr id="59" name="TextBox 58">
             <a:extLst>
               <a:ext uri="{FF2B5EF4-FFF2-40B4-BE49-F238E27FC236}">
-                <a16:creationId xmlns:a16="http://schemas.microsoft.com/office/drawing/2014/main" xmlns="" id="{39C005C1-0800-4230-B936-92A74AD72CE1}"/>
+                <a16:creationId xmlns="" xmlns:a16="http://schemas.microsoft.com/office/drawing/2014/main" id="{39C005C1-0800-4230-B936-92A74AD72CE1}"/>
               </a:ext>
             </a:extLst>
           </p:cNvPr>
@@ -4888,7 +4901,7 @@
           <p:cNvPr id="45" name="TextBox 44">
             <a:extLst>
               <a:ext uri="{FF2B5EF4-FFF2-40B4-BE49-F238E27FC236}">
-                <a16:creationId xmlns:a16="http://schemas.microsoft.com/office/drawing/2014/main" xmlns="" id="{FFDFE913-AC8B-4005-829C-1D8E5429657A}"/>
+                <a16:creationId xmlns="" xmlns:a16="http://schemas.microsoft.com/office/drawing/2014/main" id="{FFDFE913-AC8B-4005-829C-1D8E5429657A}"/>
               </a:ext>
             </a:extLst>
           </p:cNvPr>
@@ -4932,7 +4945,7 @@
           <p:cNvPr id="46" name="TextBox 45">
             <a:extLst>
               <a:ext uri="{FF2B5EF4-FFF2-40B4-BE49-F238E27FC236}">
-                <a16:creationId xmlns:a16="http://schemas.microsoft.com/office/drawing/2014/main" xmlns="" id="{A5A4FABB-069E-48CE-BA46-E6269879E309}"/>
+                <a16:creationId xmlns="" xmlns:a16="http://schemas.microsoft.com/office/drawing/2014/main" id="{A5A4FABB-069E-48CE-BA46-E6269879E309}"/>
               </a:ext>
             </a:extLst>
           </p:cNvPr>
@@ -4972,7 +4985,7 @@
           <p:cNvPr id="47" name="TextBox 46">
             <a:extLst>
               <a:ext uri="{FF2B5EF4-FFF2-40B4-BE49-F238E27FC236}">
-                <a16:creationId xmlns:a16="http://schemas.microsoft.com/office/drawing/2014/main" xmlns="" id="{A5A4FABB-069E-48CE-BA46-E6269879E309}"/>
+                <a16:creationId xmlns="" xmlns:a16="http://schemas.microsoft.com/office/drawing/2014/main" id="{A5A4FABB-069E-48CE-BA46-E6269879E309}"/>
               </a:ext>
             </a:extLst>
           </p:cNvPr>
@@ -5012,7 +5025,7 @@
           <p:cNvPr id="60" name="Rectangle: Rounded Corners 26">
             <a:extLst>
               <a:ext uri="{FF2B5EF4-FFF2-40B4-BE49-F238E27FC236}">
-                <a16:creationId xmlns:a16="http://schemas.microsoft.com/office/drawing/2014/main" xmlns="" id="{547460F9-6125-439C-BB49-EA0FD687AAEF}"/>
+                <a16:creationId xmlns="" xmlns:a16="http://schemas.microsoft.com/office/drawing/2014/main" id="{547460F9-6125-439C-BB49-EA0FD687AAEF}"/>
               </a:ext>
             </a:extLst>
           </p:cNvPr>
@@ -5066,7 +5079,7 @@
           <p:cNvPr id="54" name="TextBox 53">
             <a:extLst>
               <a:ext uri="{FF2B5EF4-FFF2-40B4-BE49-F238E27FC236}">
-                <a16:creationId xmlns:a16="http://schemas.microsoft.com/office/drawing/2014/main" xmlns="" id="{468C6CF9-A4E9-4FDA-8F26-655937EB7BB6}"/>
+                <a16:creationId xmlns="" xmlns:a16="http://schemas.microsoft.com/office/drawing/2014/main" id="{468C6CF9-A4E9-4FDA-8F26-655937EB7BB6}"/>
               </a:ext>
             </a:extLst>
           </p:cNvPr>
@@ -5111,7 +5124,7 @@
           <p:cNvPr id="57" name="TextBox 56">
             <a:extLst>
               <a:ext uri="{FF2B5EF4-FFF2-40B4-BE49-F238E27FC236}">
-                <a16:creationId xmlns:a16="http://schemas.microsoft.com/office/drawing/2014/main" xmlns="" id="{6F7B0E09-42DB-4BA5-BC6E-11CACF13E1D3}"/>
+                <a16:creationId xmlns="" xmlns:a16="http://schemas.microsoft.com/office/drawing/2014/main" id="{6F7B0E09-42DB-4BA5-BC6E-11CACF13E1D3}"/>
               </a:ext>
             </a:extLst>
           </p:cNvPr>
@@ -5419,7 +5432,7 @@
   <a:extraClrSchemeLst/>
   <a:extLst>
     <a:ext uri="{05A4C25C-085E-4340-85A3-A5531E510DB2}">
-      <thm15:themeFamily xmlns:thm15="http://schemas.microsoft.com/office/thememl/2012/main" xmlns="" name="Office Theme" id="{62F939B6-93AF-4DB8-9C6B-D6C7DFDC589F}" vid="{4A3C46E8-61CC-4603-A589-7422A47A8E4A}"/>
+      <thm15:themeFamily xmlns="" xmlns:thm15="http://schemas.microsoft.com/office/thememl/2012/main" name="Office Theme" id="{62F939B6-93AF-4DB8-9C6B-D6C7DFDC589F}" vid="{4A3C46E8-61CC-4603-A589-7422A47A8E4A}"/>
     </a:ext>
   </a:extLst>
 </a:theme>

</xml_diff>